<commit_message>
Roberts review fully incorporated
</commit_message>
<xml_diff>
--- a/Vortrag/BA_Niko_Benkler_Presentation.pptx
+++ b/Vortrag/BA_Niko_Benkler_Presentation.pptx
@@ -12083,6 +12083,22 @@
                 <a:endParaRPr lang="en-US" sz="2000" dirty="0"/>
               </a:p>
               <a:p>
+                <a:r>
+                  <a:rPr lang="en-US" sz="2000" dirty="0"/>
+                  <a:t>No </a:t>
+                </a:r>
+                <a:r>
+                  <a:rPr lang="en-US" sz="2000" i="1"/>
+                  <a:t>false positive</a:t>
+                </a:r>
+                <a:r>
+                  <a:rPr lang="en-US" sz="2000" b="1" i="1"/>
+                  <a:t> </a:t>
+                </a:r>
+                <a:r>
+                  <a:rPr lang="en-US" sz="2000"/>
+                  <a:t>microservices</a:t>
+                </a:r>
                 <a:endParaRPr lang="en-US" sz="2000" dirty="0"/>
               </a:p>
               <a:p>

</xml_diff>